<commit_message>
Update class 3 presentation
</commit_message>
<xml_diff>
--- a/g2/Class 3/Presentation/C# Basic 03.pptx
+++ b/g2/Class 3/Presentation/C# Basic 03.pptx
@@ -281,6 +281,11 @@
       </a:defRPr>
     </a:lvl9pPr>
   </p:defaultTextStyle>
+  <p:extLst>
+    <p:ext uri="{EFAFB233-063F-42B5-8137-9DF3F51BA10A}">
+      <p15:sldGuideLst xmlns:p15="http://schemas.microsoft.com/office/powerpoint/2012/main"/>
+    </p:ext>
+  </p:extLst>
 </p:presentation>
 </file>
 
@@ -12634,11 +12639,7 @@
             </a:r>
             <a:r>
               <a:rPr lang="en" sz="2400" dirty="0" smtClean="0"/>
-              <a:t>gor.mitkovski</a:t>
-            </a:r>
-            <a:r>
-              <a:rPr lang="en" sz="2400" dirty="0" smtClean="0"/>
-              <a:t>@gmail.com</a:t>
+              <a:t>gor.mitkovski@gmail.com</a:t>
             </a:r>
             <a:endParaRPr sz="2400" dirty="0" smtClean="0"/>
           </a:p>
@@ -12658,89 +12659,9 @@
               <a:t>d</a:t>
             </a:r>
             <a:r>
-              <a:rPr lang="en" sz="2400" dirty="0" smtClean="0"/>
+              <a:rPr lang="en" sz="2400" smtClean="0"/>
               <a:t>ejan.pblazheski@seavus.com</a:t>
             </a:r>
-            <a:endParaRPr sz="2400" dirty="0"/>
-          </a:p>
-          <a:p>
-            <a:pPr marL="0" lvl="0" indent="0" algn="l" rtl="0">
-              <a:spcBef>
-                <a:spcPts val="1000"/>
-              </a:spcBef>
-              <a:spcAft>
-                <a:spcPts val="0"/>
-              </a:spcAft>
-              <a:buClr>
-                <a:srgbClr val="000000"/>
-              </a:buClr>
-              <a:buSzPts val="1100"/>
-              <a:buFont typeface="Arial"/>
-              <a:buNone/>
-            </a:pPr>
-            <a:r>
-              <a:rPr lang="en" sz="2400" dirty="0"/>
-              <a:t>You </a:t>
-            </a:r>
-            <a:r>
-              <a:rPr lang="en" sz="2400" dirty="0" smtClean="0"/>
-              <a:t>can find the materials at</a:t>
-            </a:r>
-          </a:p>
-          <a:p>
-            <a:pPr marL="457200" lvl="0" indent="-381000" algn="l" rtl="0">
-              <a:spcBef>
-                <a:spcPts val="1000"/>
-              </a:spcBef>
-              <a:spcAft>
-                <a:spcPts val="0"/>
-              </a:spcAft>
-              <a:buSzPts val="2400"/>
-              <a:buChar char="▸"/>
-            </a:pPr>
-            <a:r>
-              <a:rPr lang="en" sz="2400" u="sng" dirty="0" smtClean="0">
-                <a:solidFill>
-                  <a:schemeClr val="hlink"/>
-                </a:solidFill>
-                <a:hlinkClick r:id="rId4"/>
-              </a:rPr>
-              <a:t>Presentations Link</a:t>
-            </a:r>
-            <a:endParaRPr sz="2400" dirty="0" smtClean="0"/>
-          </a:p>
-          <a:p>
-            <a:pPr marL="457200" lvl="0" indent="-381000" algn="l" rtl="0">
-              <a:spcBef>
-                <a:spcPts val="0"/>
-              </a:spcBef>
-              <a:spcAft>
-                <a:spcPts val="0"/>
-              </a:spcAft>
-              <a:buSzPts val="2400"/>
-              <a:buChar char="▸"/>
-            </a:pPr>
-            <a:r>
-              <a:rPr lang="en" sz="2400" u="sng" dirty="0" smtClean="0">
-                <a:solidFill>
-                  <a:schemeClr val="hlink"/>
-                </a:solidFill>
-                <a:hlinkClick r:id="rId5"/>
-              </a:rPr>
-              <a:t>Repository with the code Link</a:t>
-            </a:r>
-            <a:endParaRPr sz="2400" dirty="0" smtClean="0"/>
-          </a:p>
-          <a:p>
-            <a:pPr marL="0" lvl="0" indent="0" algn="l" rtl="0">
-              <a:spcBef>
-                <a:spcPts val="1000"/>
-              </a:spcBef>
-              <a:spcAft>
-                <a:spcPts val="1000"/>
-              </a:spcAft>
-              <a:buNone/>
-            </a:pPr>
             <a:endParaRPr sz="2400" dirty="0"/>
           </a:p>
         </p:txBody>

</xml_diff>